<commit_message>
added rubric precal slides
</commit_message>
<xml_diff>
--- a/print/Precal_16_1.pptx
+++ b/print/Precal_16_1.pptx
@@ -5855,7 +5855,27 @@
                   </a:schemeClr>
                 </a:solidFill>
               </a:rPr>
-              <a:t>Read through the video game expectations (to your right).</a:t>
+              <a:t>Read through the video game </a:t>
+            </a:r>
+            <a:r>
+              <a:rPr u="sng">
+                <a:solidFill>
+                  <a:schemeClr val="accent1">
+                    <a:lumOff val="-6117"/>
+                  </a:schemeClr>
+                </a:solidFill>
+              </a:rPr>
+              <a:t>grading rubric</a:t>
+            </a:r>
+            <a:r>
+              <a:rPr>
+                <a:solidFill>
+                  <a:schemeClr val="accent1">
+                    <a:lumOff val="-6117"/>
+                  </a:schemeClr>
+                </a:solidFill>
+              </a:rPr>
+              <a:t> (to your right).</a:t>
             </a:r>
             <a:endParaRPr>
               <a:solidFill>
@@ -5955,14 +5975,14 @@
       </p:sp>
       <p:sp>
         <p:nvSpPr>
-          <p:cNvPr id="195" name="What you should have done with your video game:…"/>
+          <p:cNvPr id="195" name="Grading rubric…"/>
           <p:cNvSpPr txBox="1"/>
           <p:nvPr/>
         </p:nvSpPr>
         <p:spPr>
           <a:xfrm>
             <a:off x="4517219" y="633900"/>
-            <a:ext cx="4123517" cy="3821510"/>
+            <a:ext cx="4123517" cy="3784601"/>
           </a:xfrm>
           <a:prstGeom prst="rect">
             <a:avLst/>
@@ -5982,165 +6002,201 @@
           </a:bodyPr>
           <a:lstStyle/>
           <a:p>
-            <a:pPr>
-              <a:defRPr sz="1700">
+            <a:pPr defTabSz="457200">
+              <a:defRPr b="1" sz="1500" u="sng">
                 <a:solidFill>
-                  <a:srgbClr val="D38301"/>
+                  <a:schemeClr val="accent5">
+                    <a:lumOff val="-9843"/>
+                  </a:schemeClr>
                 </a:solidFill>
               </a:defRPr>
             </a:pPr>
             <a:r>
-              <a:t>What you should have done with your video game:</a:t>
-            </a:r>
-          </a:p>
-          <a:p>
-            <a:pPr marL="233947" indent="-233947">
-              <a:buSzPct val="100000"/>
-              <a:buAutoNum type="arabicPeriod" startAt="1"/>
+              <a:t>Grading rubric</a:t>
+            </a:r>
+          </a:p>
+          <a:p>
+            <a:pPr defTabSz="457200">
+              <a:defRPr sz="1200">
+                <a:solidFill>
+                  <a:schemeClr val="accent3">
+                    <a:lumOff val="-9098"/>
+                  </a:schemeClr>
+                </a:solidFill>
+              </a:defRPr>
             </a:pPr>
             <a:r>
-              <a:t>Add your own images for player, danger, and target</a:t>
-            </a:r>
-          </a:p>
-          <a:p>
-            <a:pPr marL="233947" indent="-233947">
-              <a:buSzPct val="100000"/>
-              <a:buAutoNum type="arabicPeriod" startAt="1"/>
+              <a:t>Below is the grading rubric for your Pyret final project. Please complete with your partner this week. I'm making Monday and Tuesday workdays in class.  On Wednesday we'll start new material.</a:t>
+            </a:r>
+          </a:p>
+          <a:p>
+            <a:pPr defTabSz="457200">
+              <a:defRPr sz="1200">
+                <a:solidFill>
+                  <a:schemeClr val="accent3">
+                    <a:lumOff val="-9098"/>
+                  </a:schemeClr>
+                </a:solidFill>
+              </a:defRPr>
             </a:pPr>
-            <a:r>
-              <a:t>Make sure the danger and target are moving horizontally, by modifying the </a:t>
-            </a:r>
-            <a:r>
-              <a:rPr>
-                <a:solidFill>
-                  <a:srgbClr val="012F7B"/>
-                </a:solidFill>
-                <a:latin typeface="Courier New"/>
-                <a:ea typeface="Courier New"/>
-                <a:cs typeface="Courier New"/>
-                <a:sym typeface="Courier New"/>
-              </a:rPr>
-              <a:t>update-danger()</a:t>
-            </a:r>
-            <a:r>
-              <a:t> and              </a:t>
-            </a:r>
-            <a:r>
-              <a:rPr>
-                <a:solidFill>
-                  <a:srgbClr val="012F7B"/>
-                </a:solidFill>
-                <a:latin typeface="Courier New"/>
-                <a:ea typeface="Courier New"/>
-                <a:cs typeface="Courier New"/>
-                <a:sym typeface="Courier New"/>
-              </a:rPr>
-              <a:t>update-target() </a:t>
-            </a:r>
-            <a:r>
-              <a:t>functions</a:t>
-            </a:r>
-          </a:p>
-          <a:p>
-            <a:pPr marL="233947" indent="-233947">
-              <a:buSzPct val="100000"/>
-              <a:buAutoNum type="arabicPeriod" startAt="1"/>
-            </a:pPr>
-            <a:r>
-              <a:t>Make sure that the player can move up and down, by modifying the </a:t>
-            </a:r>
-            <a:r>
-              <a:rPr>
-                <a:solidFill>
-                  <a:srgbClr val="012F7B"/>
-                </a:solidFill>
-                <a:latin typeface="Courier New"/>
-                <a:ea typeface="Courier New"/>
-                <a:cs typeface="Courier New"/>
-                <a:sym typeface="Courier New"/>
-              </a:rPr>
-              <a:t>update-player()</a:t>
-            </a:r>
-            <a:r>
-              <a:t> function</a:t>
-            </a:r>
-          </a:p>
-          <a:p>
-            <a:pPr marL="233947" indent="-233947">
-              <a:buSzPct val="100000"/>
-              <a:buAutoNum type="arabicPeriod" startAt="1"/>
-              <a:defRPr b="1"/>
-            </a:pPr>
-            <a:r>
-              <a:t>Use the </a:t>
-            </a:r>
-            <a:r>
-              <a:rPr u="sng">
+          </a:p>
+          <a:p>
+            <a:pPr defTabSz="457200">
+              <a:defRPr b="1" sz="1200">
                 <a:solidFill>
                   <a:schemeClr val="accent5"/>
                 </a:solidFill>
-              </a:rPr>
-              <a:t>distance formula</a:t>
-            </a:r>
-            <a:r>
-              <a:t> to finish the </a:t>
-            </a:r>
-            <a:r>
-              <a:rPr>
+              </a:defRPr>
+            </a:pPr>
+            <a:r>
+              <a:t>To receive a C:</a:t>
+            </a:r>
+            <a:endParaRPr b="0"/>
+          </a:p>
+          <a:p>
+            <a:pPr marL="457200" indent="-317500" defTabSz="457200">
+              <a:buClr>
+                <a:srgbClr val="3C4043"/>
+              </a:buClr>
+              <a:buSzPct val="100000"/>
+              <a:buFont typeface="Helvetica"/>
+              <a:buChar char="•"/>
+              <a:defRPr sz="1200">
                 <a:solidFill>
-                  <a:srgbClr val="0056D6"/>
+                  <a:schemeClr val="accent3">
+                    <a:lumOff val="-9098"/>
+                  </a:schemeClr>
                 </a:solidFill>
-                <a:latin typeface="Courier New"/>
-                <a:ea typeface="Courier New"/>
-                <a:cs typeface="Courier New"/>
-                <a:sym typeface="Courier New"/>
-              </a:rPr>
-              <a:t>distance()</a:t>
-            </a:r>
-            <a:r>
-              <a:t> function. The finish the </a:t>
-            </a:r>
-            <a:r>
-              <a:rPr>
+              </a:defRPr>
+            </a:pPr>
+            <a:r>
+              <a:t>Add your own images for player, danger, and target</a:t>
+            </a:r>
+          </a:p>
+          <a:p>
+            <a:pPr marL="457200" indent="-317500" defTabSz="457200">
+              <a:buClr>
+                <a:srgbClr val="3C4043"/>
+              </a:buClr>
+              <a:buSzPct val="100000"/>
+              <a:buFont typeface="Helvetica"/>
+              <a:buChar char="•"/>
+              <a:defRPr sz="1200">
                 <a:solidFill>
-                  <a:srgbClr val="0056D6"/>
+                  <a:schemeClr val="accent3">
+                    <a:lumOff val="-9098"/>
+                  </a:schemeClr>
                 </a:solidFill>
-                <a:latin typeface="Courier New"/>
-                <a:ea typeface="Courier New"/>
-                <a:cs typeface="Courier New"/>
-                <a:sym typeface="Courier New"/>
-              </a:rPr>
-              <a:t>is-collision() </a:t>
-            </a:r>
-            <a:r>
-              <a:t>function.</a:t>
-            </a:r>
-          </a:p>
-          <a:p>
-            <a:pPr marL="233947" indent="-233947">
+              </a:defRPr>
+            </a:pPr>
+            <a:r>
+              <a:t>Make sure the danger and target are moving horizontally, by modifying the update-danger() and update-target() functions</a:t>
+            </a:r>
+          </a:p>
+          <a:p>
+            <a:pPr marL="457200" indent="-317500" defTabSz="457200">
+              <a:buClr>
+                <a:srgbClr val="3C4043"/>
+              </a:buClr>
               <a:buSzPct val="100000"/>
-              <a:buAutoNum type="arabicPeriod" startAt="1"/>
-              <a:defRPr b="1"/>
+              <a:buFont typeface="Helvetica"/>
+              <a:buChar char="•"/>
+              <a:defRPr sz="1200">
+                <a:solidFill>
+                  <a:schemeClr val="accent3">
+                    <a:lumOff val="-9098"/>
+                  </a:schemeClr>
+                </a:solidFill>
+              </a:defRPr>
             </a:pPr>
             <a:r>
-              <a:rPr b="0"/>
-              <a:t>Advanced: use the </a:t>
-            </a:r>
-            <a:r>
-              <a:rPr b="0">
+              <a:t>Make sure that the player can move up and down, by modifying the update-player() function</a:t>
+            </a:r>
+          </a:p>
+          <a:p>
+            <a:pPr marL="457200" indent="-317500" defTabSz="457200">
+              <a:buClr>
+                <a:srgbClr val="3C4043"/>
+              </a:buClr>
+              <a:buSzPct val="100000"/>
+              <a:buFont typeface="Helvetica"/>
+              <a:buChar char="•"/>
+              <a:defRPr sz="1200">
                 <a:solidFill>
-                  <a:srgbClr val="012F7B"/>
+                  <a:schemeClr val="accent3">
+                    <a:lumOff val="-9098"/>
+                  </a:schemeClr>
                 </a:solidFill>
-                <a:latin typeface="Courier New"/>
-                <a:ea typeface="Courier New"/>
-                <a:cs typeface="Courier New"/>
-                <a:sym typeface="Courier New"/>
-              </a:rPr>
-              <a:t>posn()</a:t>
-            </a:r>
-            <a:r>
-              <a:rPr b="0"/>
-              <a:t> function to make sure the characters in the game can move in more interesting directions.</a:t>
+              </a:defRPr>
+            </a:pPr>
+            <a:r>
+              <a:t>Use the distance formula to finish the distance() function. The finish the is-collision() function.</a:t>
+            </a:r>
+          </a:p>
+          <a:p>
+            <a:pPr defTabSz="457200">
+              <a:defRPr b="1" sz="1200">
+                <a:solidFill>
+                  <a:schemeClr val="accent5"/>
+                </a:solidFill>
+              </a:defRPr>
+            </a:pPr>
+            <a:r>
+              <a:t>To receive a B:</a:t>
+            </a:r>
+            <a:endParaRPr b="0"/>
+          </a:p>
+          <a:p>
+            <a:pPr marL="457200" indent="-317500" defTabSz="457200">
+              <a:buClr>
+                <a:srgbClr val="3C4043"/>
+              </a:buClr>
+              <a:buSzPct val="100000"/>
+              <a:buFont typeface="Helvetica"/>
+              <a:buChar char="•"/>
+              <a:defRPr sz="1200">
+                <a:solidFill>
+                  <a:schemeClr val="accent3">
+                    <a:lumOff val="-9098"/>
+                  </a:schemeClr>
+                </a:solidFill>
+              </a:defRPr>
+            </a:pPr>
+            <a:r>
+              <a:t> use the posn() function to make sure the characters in the game can move in more interesting directions.</a:t>
+            </a:r>
+          </a:p>
+          <a:p>
+            <a:pPr defTabSz="457200">
+              <a:defRPr b="1" sz="1200">
+                <a:solidFill>
+                  <a:schemeClr val="accent5"/>
+                </a:solidFill>
+              </a:defRPr>
+            </a:pPr>
+            <a:r>
+              <a:t>To receive an A:</a:t>
+            </a:r>
+            <a:endParaRPr b="0"/>
+          </a:p>
+          <a:p>
+            <a:pPr marL="457200" indent="-317500" defTabSz="457200">
+              <a:buClr>
+                <a:srgbClr val="3C4043"/>
+              </a:buClr>
+              <a:buSzPct val="100000"/>
+              <a:buFont typeface="Helvetica"/>
+              <a:buChar char="•"/>
+              <a:defRPr sz="1200">
+                <a:solidFill>
+                  <a:schemeClr val="accent3">
+                    <a:lumOff val="-9098"/>
+                  </a:schemeClr>
+                </a:solidFill>
+              </a:defRPr>
+            </a:pPr>
+            <a:r>
+              <a:t>Make sure that the danger or target follow the path of a quadratic function (see example game).</a:t>
             </a:r>
           </a:p>
         </p:txBody>
@@ -6954,8 +7010,8 @@
       </p:par>
     </p:tnLst>
     <p:bldLst>
+      <p:bldP build="p" bldLvl="5" animBg="1" rev="0" advAuto="0" spid="194" grpId="1"/>
       <p:bldP build="p" bldLvl="5" animBg="1" rev="0" advAuto="0" spid="196" grpId="2"/>
-      <p:bldP build="p" bldLvl="5" animBg="1" rev="0" advAuto="0" spid="194" grpId="1"/>
     </p:bldLst>
   </p:timing>
 </p:sld>

</xml_diff>